<commit_message>
Add logistic regression challenge
</commit_message>
<xml_diff>
--- a/figures/figures.pptx
+++ b/figures/figures.pptx
@@ -5,8 +5,10 @@
     <p:sldMasterId id="2147483660" r:id="rId1"/>
   </p:sldMasterIdLst>
   <p:sldIdLst>
-    <p:sldId id="257" r:id="rId2"/>
-    <p:sldId id="258" r:id="rId3"/>
+    <p:sldId id="260" r:id="rId2"/>
+    <p:sldId id="261" r:id="rId3"/>
+    <p:sldId id="257" r:id="rId4"/>
+    <p:sldId id="258" r:id="rId5"/>
   </p:sldIdLst>
   <p:sldSz cx="9144000" cy="6858000" type="screen4x3"/>
   <p:notesSz cx="6858000" cy="9144000"/>
@@ -650,7 +652,7 @@
                   <a:spcPct val="0"/>
                 </a:spcAft>
               </a:pPr>
-              <a:t>November 12, 2014</a:t>
+              <a:t>November 13, 2014</a:t>
             </a:fld>
             <a:endParaRPr lang="en-US" sz="2400">
               <a:solidFill>
@@ -856,7 +858,7 @@
                   <a:spcPct val="0"/>
                 </a:spcAft>
               </a:pPr>
-              <a:t>November 12, 2014</a:t>
+              <a:t>November 13, 2014</a:t>
             </a:fld>
             <a:endParaRPr lang="en-US" sz="2400">
               <a:solidFill>
@@ -1572,6 +1574,870 @@
 </file>
 
 <file path=ppt/slides/slide1.xml><?xml version="1.0" encoding="utf-8"?>
+<p:sld xmlns:a="http://schemas.openxmlformats.org/drawingml/2006/main" xmlns:r="http://schemas.openxmlformats.org/officeDocument/2006/relationships" xmlns:p="http://schemas.openxmlformats.org/presentationml/2006/main">
+  <p:cSld>
+    <p:spTree>
+      <p:nvGrpSpPr>
+        <p:cNvPr id="1" name=""/>
+        <p:cNvGrpSpPr/>
+        <p:nvPr/>
+      </p:nvGrpSpPr>
+      <p:grpSpPr>
+        <a:xfrm>
+          <a:off x="0" y="0"/>
+          <a:ext cx="0" cy="0"/>
+          <a:chOff x="0" y="0"/>
+          <a:chExt cx="0" cy="0"/>
+        </a:xfrm>
+      </p:grpSpPr>
+      <p:pic>
+        <p:nvPicPr>
+          <p:cNvPr id="3" name="Picture 2"/>
+          <p:cNvPicPr>
+            <a:picLocks noChangeAspect="1"/>
+          </p:cNvPicPr>
+          <p:nvPr/>
+        </p:nvPicPr>
+        <p:blipFill>
+          <a:blip r:embed="rId2"/>
+          <a:stretch>
+            <a:fillRect/>
+          </a:stretch>
+        </p:blipFill>
+        <p:spPr>
+          <a:xfrm>
+            <a:off x="1388184" y="1087165"/>
+            <a:ext cx="2794000" cy="2844800"/>
+          </a:xfrm>
+          <a:prstGeom prst="rect">
+            <a:avLst/>
+          </a:prstGeom>
+        </p:spPr>
+      </p:pic>
+      <p:pic>
+        <p:nvPicPr>
+          <p:cNvPr id="4" name="Picture 3"/>
+          <p:cNvPicPr>
+            <a:picLocks noChangeAspect="1"/>
+          </p:cNvPicPr>
+          <p:nvPr/>
+        </p:nvPicPr>
+        <p:blipFill>
+          <a:blip r:embed="rId3"/>
+          <a:stretch>
+            <a:fillRect/>
+          </a:stretch>
+        </p:blipFill>
+        <p:spPr>
+          <a:xfrm>
+            <a:off x="533400" y="4822660"/>
+            <a:ext cx="3515895" cy="1946764"/>
+          </a:xfrm>
+          <a:prstGeom prst="rect">
+            <a:avLst/>
+          </a:prstGeom>
+        </p:spPr>
+      </p:pic>
+      <p:sp>
+        <p:nvSpPr>
+          <p:cNvPr id="12" name="TextBox 11"/>
+          <p:cNvSpPr txBox="1"/>
+          <p:nvPr/>
+        </p:nvSpPr>
+        <p:spPr>
+          <a:xfrm>
+            <a:off x="2930657" y="4334259"/>
+            <a:ext cx="1261734" cy="461665"/>
+          </a:xfrm>
+          <a:prstGeom prst="rect">
+            <a:avLst/>
+          </a:prstGeom>
+          <a:noFill/>
+        </p:spPr>
+        <p:txBody>
+          <a:bodyPr wrap="none" rtlCol="0">
+            <a:spAutoFit/>
+          </a:bodyPr>
+          <a:lstStyle/>
+          <a:p>
+            <a:r>
+              <a:rPr lang="en-US" b="1" dirty="0" smtClean="0">
+                <a:solidFill>
+                  <a:srgbClr val="0000FF"/>
+                </a:solidFill>
+              </a:rPr>
+              <a:t>Munich</a:t>
+            </a:r>
+            <a:endParaRPr lang="en-US" b="1" dirty="0">
+              <a:solidFill>
+                <a:srgbClr val="0000FF"/>
+              </a:solidFill>
+            </a:endParaRPr>
+          </a:p>
+        </p:txBody>
+      </p:sp>
+      <p:sp>
+        <p:nvSpPr>
+          <p:cNvPr id="13" name="Oval 12"/>
+          <p:cNvSpPr/>
+          <p:nvPr/>
+        </p:nvSpPr>
+        <p:spPr bwMode="auto">
+          <a:xfrm>
+            <a:off x="2970761" y="3123183"/>
+            <a:ext cx="252902" cy="252902"/>
+          </a:xfrm>
+          <a:prstGeom prst="ellipse">
+            <a:avLst/>
+          </a:prstGeom>
+          <a:solidFill>
+            <a:srgbClr val="0000FF"/>
+          </a:solidFill>
+          <a:ln w="9525" cap="flat" cmpd="sng" algn="ctr">
+            <a:noFill/>
+            <a:prstDash val="solid"/>
+            <a:round/>
+            <a:headEnd type="none" w="med" len="med"/>
+            <a:tailEnd type="none" w="med" len="med"/>
+          </a:ln>
+          <a:effectLst/>
+        </p:spPr>
+        <p:txBody>
+          <a:bodyPr vert="horz" wrap="square" lIns="91440" tIns="45720" rIns="91440" bIns="45720" numCol="1" rtlCol="0" anchor="t" anchorCtr="0" compatLnSpc="1">
+            <a:prstTxWarp prst="textNoShape">
+              <a:avLst/>
+            </a:prstTxWarp>
+          </a:bodyPr>
+          <a:lstStyle/>
+          <a:p>
+            <a:pPr marL="0" marR="0" indent="0" algn="l" defTabSz="1981200" rtl="0" eaLnBrk="0" fontAlgn="base" latinLnBrk="0" hangingPunct="0">
+              <a:lnSpc>
+                <a:spcPct val="100000"/>
+              </a:lnSpc>
+              <a:spcBef>
+                <a:spcPct val="0"/>
+              </a:spcBef>
+              <a:spcAft>
+                <a:spcPct val="0"/>
+              </a:spcAft>
+              <a:buClrTx/>
+              <a:buSzTx/>
+              <a:buFontTx/>
+              <a:buNone/>
+              <a:tabLst/>
+            </a:pPr>
+            <a:endParaRPr kumimoji="0" lang="en-US" sz="5200" b="0" i="0" u="none" strike="noStrike" cap="none" normalizeH="0" baseline="0" smtClean="0">
+              <a:ln>
+                <a:noFill/>
+              </a:ln>
+              <a:solidFill>
+                <a:schemeClr val="tx1"/>
+              </a:solidFill>
+              <a:effectLst/>
+              <a:latin typeface="Arial" charset="0"/>
+            </a:endParaRPr>
+          </a:p>
+        </p:txBody>
+      </p:sp>
+      <p:cxnSp>
+        <p:nvCxnSpPr>
+          <p:cNvPr id="14" name="Straight Arrow Connector 13"/>
+          <p:cNvCxnSpPr/>
+          <p:nvPr/>
+        </p:nvCxnSpPr>
+        <p:spPr bwMode="auto">
+          <a:xfrm flipH="1" flipV="1">
+            <a:off x="3183559" y="3410050"/>
+            <a:ext cx="314592" cy="838355"/>
+          </a:xfrm>
+          <a:prstGeom prst="straightConnector1">
+            <a:avLst/>
+          </a:prstGeom>
+          <a:solidFill>
+            <a:schemeClr val="accent1"/>
+          </a:solidFill>
+          <a:ln w="57150" cap="flat" cmpd="sng" algn="ctr">
+            <a:solidFill>
+              <a:schemeClr val="tx1"/>
+            </a:solidFill>
+            <a:prstDash val="solid"/>
+            <a:round/>
+            <a:headEnd type="none" w="med" len="med"/>
+            <a:tailEnd type="arrow"/>
+          </a:ln>
+          <a:effectLst/>
+        </p:spPr>
+      </p:cxnSp>
+      <p:pic>
+        <p:nvPicPr>
+          <p:cNvPr id="5" name="Picture 4"/>
+          <p:cNvPicPr>
+            <a:picLocks noChangeAspect="1"/>
+          </p:cNvPicPr>
+          <p:nvPr/>
+        </p:nvPicPr>
+        <p:blipFill rotWithShape="1">
+          <a:blip r:embed="rId4"/>
+          <a:srcRect r="50274"/>
+          <a:stretch/>
+        </p:blipFill>
+        <p:spPr>
+          <a:xfrm>
+            <a:off x="6805896" y="4795924"/>
+            <a:ext cx="2058737" cy="1968500"/>
+          </a:xfrm>
+          <a:prstGeom prst="rect">
+            <a:avLst/>
+          </a:prstGeom>
+        </p:spPr>
+      </p:pic>
+      <p:pic>
+        <p:nvPicPr>
+          <p:cNvPr id="7" name="Picture 6"/>
+          <p:cNvPicPr>
+            <a:picLocks noChangeAspect="1"/>
+          </p:cNvPicPr>
+          <p:nvPr/>
+        </p:nvPicPr>
+        <p:blipFill>
+          <a:blip r:embed="rId5"/>
+          <a:stretch>
+            <a:fillRect/>
+          </a:stretch>
+        </p:blipFill>
+        <p:spPr>
+          <a:xfrm>
+            <a:off x="5913435" y="4399549"/>
+            <a:ext cx="2273300" cy="1193800"/>
+          </a:xfrm>
+          <a:prstGeom prst="rect">
+            <a:avLst/>
+          </a:prstGeom>
+        </p:spPr>
+      </p:pic>
+      <p:pic>
+        <p:nvPicPr>
+          <p:cNvPr id="10" name="Picture 9"/>
+          <p:cNvPicPr>
+            <a:picLocks noChangeAspect="1"/>
+          </p:cNvPicPr>
+          <p:nvPr/>
+        </p:nvPicPr>
+        <p:blipFill>
+          <a:blip r:embed="rId6"/>
+          <a:stretch>
+            <a:fillRect/>
+          </a:stretch>
+        </p:blipFill>
+        <p:spPr>
+          <a:xfrm>
+            <a:off x="4825759" y="1651576"/>
+            <a:ext cx="2801509" cy="1549179"/>
+          </a:xfrm>
+          <a:prstGeom prst="rect">
+            <a:avLst/>
+          </a:prstGeom>
+        </p:spPr>
+      </p:pic>
+      <p:sp>
+        <p:nvSpPr>
+          <p:cNvPr id="15" name="TextBox 14"/>
+          <p:cNvSpPr txBox="1"/>
+          <p:nvPr/>
+        </p:nvSpPr>
+        <p:spPr>
+          <a:xfrm>
+            <a:off x="4682035" y="1066800"/>
+            <a:ext cx="3057648" cy="584776"/>
+          </a:xfrm>
+          <a:prstGeom prst="rect">
+            <a:avLst/>
+          </a:prstGeom>
+          <a:noFill/>
+        </p:spPr>
+        <p:txBody>
+          <a:bodyPr wrap="none" rtlCol="0">
+            <a:spAutoFit/>
+          </a:bodyPr>
+          <a:lstStyle/>
+          <a:p>
+            <a:r>
+              <a:rPr lang="en-US" sz="3200" b="1" dirty="0" smtClean="0">
+                <a:effectLst>
+                  <a:glow rad="88900">
+                    <a:srgbClr val="0000FF">
+                      <a:alpha val="75000"/>
+                    </a:srgbClr>
+                  </a:glow>
+                </a:effectLst>
+              </a:rPr>
+              <a:t>Bioinformatics</a:t>
+            </a:r>
+            <a:endParaRPr lang="en-US" sz="3200" b="1" dirty="0">
+              <a:effectLst>
+                <a:glow rad="88900">
+                  <a:srgbClr val="0000FF">
+                    <a:alpha val="75000"/>
+                  </a:srgbClr>
+                </a:glow>
+              </a:effectLst>
+            </a:endParaRPr>
+          </a:p>
+        </p:txBody>
+      </p:sp>
+      <p:sp>
+        <p:nvSpPr>
+          <p:cNvPr id="16" name="TextBox 15"/>
+          <p:cNvSpPr txBox="1"/>
+          <p:nvPr/>
+        </p:nvSpPr>
+        <p:spPr>
+          <a:xfrm flipH="1">
+            <a:off x="4761198" y="3343675"/>
+            <a:ext cx="3636211" cy="830997"/>
+          </a:xfrm>
+          <a:prstGeom prst="rect">
+            <a:avLst/>
+          </a:prstGeom>
+          <a:noFill/>
+        </p:spPr>
+        <p:txBody>
+          <a:bodyPr wrap="square" rtlCol="0">
+            <a:spAutoFit/>
+          </a:bodyPr>
+          <a:lstStyle/>
+          <a:p>
+            <a:r>
+              <a:rPr lang="en-US" dirty="0" smtClean="0"/>
+              <a:t>Bachelor of Science</a:t>
+            </a:r>
+          </a:p>
+          <a:p>
+            <a:r>
+              <a:rPr lang="en-US" dirty="0" smtClean="0"/>
+              <a:t>Master of Science</a:t>
+            </a:r>
+            <a:endParaRPr lang="en-US" dirty="0"/>
+          </a:p>
+        </p:txBody>
+      </p:sp>
+      <p:pic>
+        <p:nvPicPr>
+          <p:cNvPr id="17" name="Picture 16"/>
+          <p:cNvPicPr>
+            <a:picLocks noChangeAspect="1"/>
+          </p:cNvPicPr>
+          <p:nvPr/>
+        </p:nvPicPr>
+        <p:blipFill>
+          <a:blip r:embed="rId7"/>
+          <a:stretch>
+            <a:fillRect/>
+          </a:stretch>
+        </p:blipFill>
+        <p:spPr>
+          <a:xfrm>
+            <a:off x="618" y="847835"/>
+            <a:ext cx="1431361" cy="1967099"/>
+          </a:xfrm>
+          <a:prstGeom prst="rect">
+            <a:avLst/>
+          </a:prstGeom>
+        </p:spPr>
+      </p:pic>
+      <p:cxnSp>
+        <p:nvCxnSpPr>
+          <p:cNvPr id="6" name="Straight Connector 5"/>
+          <p:cNvCxnSpPr/>
+          <p:nvPr/>
+        </p:nvCxnSpPr>
+        <p:spPr bwMode="auto">
+          <a:xfrm flipV="1">
+            <a:off x="533400" y="1480207"/>
+            <a:ext cx="898579" cy="586827"/>
+          </a:xfrm>
+          <a:prstGeom prst="line">
+            <a:avLst/>
+          </a:prstGeom>
+          <a:solidFill>
+            <a:schemeClr val="accent1"/>
+          </a:solidFill>
+          <a:ln w="9525" cap="flat" cmpd="sng" algn="ctr">
+            <a:solidFill>
+              <a:schemeClr val="tx1"/>
+            </a:solidFill>
+            <a:prstDash val="sysDash"/>
+            <a:round/>
+            <a:headEnd type="none" w="med" len="med"/>
+            <a:tailEnd type="none" w="med" len="med"/>
+          </a:ln>
+          <a:effectLst/>
+        </p:spPr>
+      </p:cxnSp>
+      <p:cxnSp>
+        <p:nvCxnSpPr>
+          <p:cNvPr id="20" name="Straight Connector 19"/>
+          <p:cNvCxnSpPr/>
+          <p:nvPr/>
+        </p:nvCxnSpPr>
+        <p:spPr bwMode="auto">
+          <a:xfrm>
+            <a:off x="613103" y="2671379"/>
+            <a:ext cx="1138621" cy="998483"/>
+          </a:xfrm>
+          <a:prstGeom prst="line">
+            <a:avLst/>
+          </a:prstGeom>
+          <a:solidFill>
+            <a:schemeClr val="accent1"/>
+          </a:solidFill>
+          <a:ln w="9525" cap="flat" cmpd="sng" algn="ctr">
+            <a:solidFill>
+              <a:schemeClr val="tx1"/>
+            </a:solidFill>
+            <a:prstDash val="sysDash"/>
+            <a:round/>
+            <a:headEnd type="none" w="med" len="med"/>
+            <a:tailEnd type="none" w="med" len="med"/>
+          </a:ln>
+          <a:effectLst/>
+        </p:spPr>
+      </p:cxnSp>
+    </p:spTree>
+    <p:extLst>
+      <p:ext uri="{BB962C8B-B14F-4D97-AF65-F5344CB8AC3E}">
+        <p14:creationId xmlns:p14="http://schemas.microsoft.com/office/powerpoint/2010/main" val="2015900871"/>
+      </p:ext>
+    </p:extLst>
+  </p:cSld>
+  <p:clrMapOvr>
+    <a:masterClrMapping/>
+  </p:clrMapOvr>
+  <p:transition xmlns:p14="http://schemas.microsoft.com/office/powerpoint/2010/main">
+    <p:cut/>
+  </p:transition>
+  <p:timing>
+    <p:tnLst>
+      <p:par>
+        <p:cTn xmlns:p14="http://schemas.microsoft.com/office/powerpoint/2010/main" id="1" dur="indefinite" restart="never" nodeType="tmRoot"/>
+      </p:par>
+    </p:tnLst>
+  </p:timing>
+</p:sld>
+</file>
+
+<file path=ppt/slides/slide2.xml><?xml version="1.0" encoding="utf-8"?>
+<p:sld xmlns:a="http://schemas.openxmlformats.org/drawingml/2006/main" xmlns:r="http://schemas.openxmlformats.org/officeDocument/2006/relationships" xmlns:p="http://schemas.openxmlformats.org/presentationml/2006/main">
+  <p:cSld>
+    <p:spTree>
+      <p:nvGrpSpPr>
+        <p:cNvPr id="1" name=""/>
+        <p:cNvGrpSpPr/>
+        <p:nvPr/>
+      </p:nvGrpSpPr>
+      <p:grpSpPr>
+        <a:xfrm>
+          <a:off x="0" y="0"/>
+          <a:ext cx="0" cy="0"/>
+          <a:chOff x="0" y="0"/>
+          <a:chExt cx="0" cy="0"/>
+        </a:xfrm>
+      </p:grpSpPr>
+      <p:pic>
+        <p:nvPicPr>
+          <p:cNvPr id="4" name="Picture 3"/>
+          <p:cNvPicPr>
+            <a:picLocks noChangeAspect="1"/>
+          </p:cNvPicPr>
+          <p:nvPr/>
+        </p:nvPicPr>
+        <p:blipFill rotWithShape="1">
+          <a:blip r:embed="rId2"/>
+          <a:srcRect t="6433"/>
+          <a:stretch/>
+        </p:blipFill>
+        <p:spPr>
+          <a:xfrm>
+            <a:off x="6193589" y="660497"/>
+            <a:ext cx="2843582" cy="5542450"/>
+          </a:xfrm>
+          <a:prstGeom prst="rect">
+            <a:avLst/>
+          </a:prstGeom>
+        </p:spPr>
+      </p:pic>
+      <p:pic>
+        <p:nvPicPr>
+          <p:cNvPr id="9" name="Picture 8"/>
+          <p:cNvPicPr>
+            <a:picLocks noChangeAspect="1"/>
+          </p:cNvPicPr>
+          <p:nvPr/>
+        </p:nvPicPr>
+        <p:blipFill>
+          <a:blip r:embed="rId3"/>
+          <a:stretch>
+            <a:fillRect/>
+          </a:stretch>
+        </p:blipFill>
+        <p:spPr>
+          <a:xfrm>
+            <a:off x="2203822" y="1164319"/>
+            <a:ext cx="2935942" cy="924822"/>
+          </a:xfrm>
+          <a:prstGeom prst="rect">
+            <a:avLst/>
+          </a:prstGeom>
+        </p:spPr>
+      </p:pic>
+      <p:grpSp>
+        <p:nvGrpSpPr>
+          <p:cNvPr id="11" name="Group 10"/>
+          <p:cNvGrpSpPr/>
+          <p:nvPr/>
+        </p:nvGrpSpPr>
+        <p:grpSpPr>
+          <a:xfrm>
+            <a:off x="978646" y="2179725"/>
+            <a:ext cx="4534647" cy="2599764"/>
+            <a:chOff x="905435" y="1797050"/>
+            <a:chExt cx="5840506" cy="3723714"/>
+          </a:xfrm>
+        </p:grpSpPr>
+        <p:pic>
+          <p:nvPicPr>
+            <p:cNvPr id="10" name="Picture 9"/>
+            <p:cNvPicPr>
+              <a:picLocks noChangeAspect="1"/>
+            </p:cNvPicPr>
+            <p:nvPr/>
+          </p:nvPicPr>
+          <p:blipFill>
+            <a:blip r:embed="rId4"/>
+            <a:stretch>
+              <a:fillRect/>
+            </a:stretch>
+          </p:blipFill>
+          <p:spPr>
+            <a:xfrm>
+              <a:off x="905435" y="1797050"/>
+              <a:ext cx="3860800" cy="2171700"/>
+            </a:xfrm>
+            <a:prstGeom prst="rect">
+              <a:avLst/>
+            </a:prstGeom>
+          </p:spPr>
+        </p:pic>
+        <p:pic>
+          <p:nvPicPr>
+            <p:cNvPr id="8" name="Picture 7"/>
+            <p:cNvPicPr>
+              <a:picLocks noChangeAspect="1"/>
+            </p:cNvPicPr>
+            <p:nvPr/>
+          </p:nvPicPr>
+          <p:blipFill>
+            <a:blip r:embed="rId5"/>
+            <a:stretch>
+              <a:fillRect/>
+            </a:stretch>
+          </p:blipFill>
+          <p:spPr>
+            <a:xfrm>
+              <a:off x="3784963" y="3673114"/>
+              <a:ext cx="2960978" cy="1847650"/>
+            </a:xfrm>
+            <a:prstGeom prst="rect">
+              <a:avLst/>
+            </a:prstGeom>
+          </p:spPr>
+        </p:pic>
+      </p:grpSp>
+      <p:pic>
+        <p:nvPicPr>
+          <p:cNvPr id="12" name="Picture 11"/>
+          <p:cNvPicPr>
+            <a:picLocks noChangeAspect="1"/>
+          </p:cNvPicPr>
+          <p:nvPr/>
+        </p:nvPicPr>
+        <p:blipFill>
+          <a:blip r:embed="rId6"/>
+          <a:stretch>
+            <a:fillRect/>
+          </a:stretch>
+        </p:blipFill>
+        <p:spPr>
+          <a:xfrm>
+            <a:off x="226391" y="4459292"/>
+            <a:ext cx="1000333" cy="1080114"/>
+          </a:xfrm>
+          <a:prstGeom prst="rect">
+            <a:avLst/>
+          </a:prstGeom>
+        </p:spPr>
+      </p:pic>
+      <p:sp>
+        <p:nvSpPr>
+          <p:cNvPr id="13" name="TextBox 12"/>
+          <p:cNvSpPr txBox="1"/>
+          <p:nvPr/>
+        </p:nvSpPr>
+        <p:spPr>
+          <a:xfrm>
+            <a:off x="156779" y="5539406"/>
+            <a:ext cx="1125518" cy="584776"/>
+          </a:xfrm>
+          <a:prstGeom prst="rect">
+            <a:avLst/>
+          </a:prstGeom>
+          <a:noFill/>
+        </p:spPr>
+        <p:txBody>
+          <a:bodyPr wrap="square" rtlCol="0">
+            <a:spAutoFit/>
+          </a:bodyPr>
+          <a:lstStyle>
+            <a:defPPr>
+              <a:defRPr lang="en-US"/>
+            </a:defPPr>
+            <a:lvl1pPr algn="l" defTabSz="457200" rtl="0" fontAlgn="base">
+              <a:spcBef>
+                <a:spcPct val="0"/>
+              </a:spcBef>
+              <a:spcAft>
+                <a:spcPct val="0"/>
+              </a:spcAft>
+              <a:defRPr sz="2400" kern="1200">
+                <a:solidFill>
+                  <a:schemeClr val="tx1"/>
+                </a:solidFill>
+                <a:latin typeface="Arial" charset="0"/>
+                <a:ea typeface="ＭＳ Ｐゴシック" charset="0"/>
+                <a:cs typeface="ＭＳ Ｐゴシック" charset="0"/>
+              </a:defRPr>
+            </a:lvl1pPr>
+            <a:lvl2pPr marL="457200" algn="l" defTabSz="457200" rtl="0" fontAlgn="base">
+              <a:spcBef>
+                <a:spcPct val="0"/>
+              </a:spcBef>
+              <a:spcAft>
+                <a:spcPct val="0"/>
+              </a:spcAft>
+              <a:defRPr sz="2400" kern="1200">
+                <a:solidFill>
+                  <a:schemeClr val="tx1"/>
+                </a:solidFill>
+                <a:latin typeface="Arial" charset="0"/>
+                <a:ea typeface="ＭＳ Ｐゴシック" charset="0"/>
+                <a:cs typeface="ＭＳ Ｐゴシック" charset="0"/>
+              </a:defRPr>
+            </a:lvl2pPr>
+            <a:lvl3pPr marL="914400" algn="l" defTabSz="457200" rtl="0" fontAlgn="base">
+              <a:spcBef>
+                <a:spcPct val="0"/>
+              </a:spcBef>
+              <a:spcAft>
+                <a:spcPct val="0"/>
+              </a:spcAft>
+              <a:defRPr sz="2400" kern="1200">
+                <a:solidFill>
+                  <a:schemeClr val="tx1"/>
+                </a:solidFill>
+                <a:latin typeface="Arial" charset="0"/>
+                <a:ea typeface="ＭＳ Ｐゴシック" charset="0"/>
+                <a:cs typeface="ＭＳ Ｐゴシック" charset="0"/>
+              </a:defRPr>
+            </a:lvl3pPr>
+            <a:lvl4pPr marL="1371600" algn="l" defTabSz="457200" rtl="0" fontAlgn="base">
+              <a:spcBef>
+                <a:spcPct val="0"/>
+              </a:spcBef>
+              <a:spcAft>
+                <a:spcPct val="0"/>
+              </a:spcAft>
+              <a:defRPr sz="2400" kern="1200">
+                <a:solidFill>
+                  <a:schemeClr val="tx1"/>
+                </a:solidFill>
+                <a:latin typeface="Arial" charset="0"/>
+                <a:ea typeface="ＭＳ Ｐゴシック" charset="0"/>
+                <a:cs typeface="ＭＳ Ｐゴシック" charset="0"/>
+              </a:defRPr>
+            </a:lvl4pPr>
+            <a:lvl5pPr marL="1828800" algn="l" defTabSz="457200" rtl="0" fontAlgn="base">
+              <a:spcBef>
+                <a:spcPct val="0"/>
+              </a:spcBef>
+              <a:spcAft>
+                <a:spcPct val="0"/>
+              </a:spcAft>
+              <a:defRPr sz="2400" kern="1200">
+                <a:solidFill>
+                  <a:schemeClr val="tx1"/>
+                </a:solidFill>
+                <a:latin typeface="Arial" charset="0"/>
+                <a:ea typeface="ＭＳ Ｐゴシック" charset="0"/>
+                <a:cs typeface="ＭＳ Ｐゴシック" charset="0"/>
+              </a:defRPr>
+            </a:lvl5pPr>
+            <a:lvl6pPr marL="2286000" algn="l" defTabSz="457200" rtl="0" eaLnBrk="1" latinLnBrk="0" hangingPunct="1">
+              <a:defRPr sz="2400" kern="1200">
+                <a:solidFill>
+                  <a:schemeClr val="tx1"/>
+                </a:solidFill>
+                <a:latin typeface="Arial" charset="0"/>
+                <a:ea typeface="ＭＳ Ｐゴシック" charset="0"/>
+                <a:cs typeface="ＭＳ Ｐゴシック" charset="0"/>
+              </a:defRPr>
+            </a:lvl6pPr>
+            <a:lvl7pPr marL="2743200" algn="l" defTabSz="457200" rtl="0" eaLnBrk="1" latinLnBrk="0" hangingPunct="1">
+              <a:defRPr sz="2400" kern="1200">
+                <a:solidFill>
+                  <a:schemeClr val="tx1"/>
+                </a:solidFill>
+                <a:latin typeface="Arial" charset="0"/>
+                <a:ea typeface="ＭＳ Ｐゴシック" charset="0"/>
+                <a:cs typeface="ＭＳ Ｐゴシック" charset="0"/>
+              </a:defRPr>
+            </a:lvl7pPr>
+            <a:lvl8pPr marL="3200400" algn="l" defTabSz="457200" rtl="0" eaLnBrk="1" latinLnBrk="0" hangingPunct="1">
+              <a:defRPr sz="2400" kern="1200">
+                <a:solidFill>
+                  <a:schemeClr val="tx1"/>
+                </a:solidFill>
+                <a:latin typeface="Arial" charset="0"/>
+                <a:ea typeface="ＭＳ Ｐゴシック" charset="0"/>
+                <a:cs typeface="ＭＳ Ｐゴシック" charset="0"/>
+              </a:defRPr>
+            </a:lvl8pPr>
+            <a:lvl9pPr marL="3657600" algn="l" defTabSz="457200" rtl="0" eaLnBrk="1" latinLnBrk="0" hangingPunct="1">
+              <a:defRPr sz="2400" kern="1200">
+                <a:solidFill>
+                  <a:schemeClr val="tx1"/>
+                </a:solidFill>
+                <a:latin typeface="Arial" charset="0"/>
+                <a:ea typeface="ＭＳ Ｐゴシック" charset="0"/>
+                <a:cs typeface="ＭＳ Ｐゴシック" charset="0"/>
+              </a:defRPr>
+            </a:lvl9pPr>
+          </a:lstStyle>
+          <a:p>
+            <a:pPr algn="ctr"/>
+            <a:r>
+              <a:rPr lang="en-US" sz="1600" dirty="0" smtClean="0">
+                <a:solidFill>
+                  <a:srgbClr val="000000"/>
+                </a:solidFill>
+              </a:rPr>
+              <a:t>Oliver </a:t>
+            </a:r>
+            <a:r>
+              <a:rPr lang="en-US" sz="1600" dirty="0" err="1" smtClean="0">
+                <a:solidFill>
+                  <a:srgbClr val="000000"/>
+                </a:solidFill>
+              </a:rPr>
+              <a:t>Stegle</a:t>
+            </a:r>
+            <a:endParaRPr lang="en-US" sz="1600" dirty="0" smtClean="0">
+              <a:solidFill>
+                <a:srgbClr val="000000"/>
+              </a:solidFill>
+            </a:endParaRPr>
+          </a:p>
+        </p:txBody>
+      </p:sp>
+      <p:pic>
+        <p:nvPicPr>
+          <p:cNvPr id="14" name="Picture 13"/>
+          <p:cNvPicPr>
+            <a:picLocks noChangeAspect="1"/>
+          </p:cNvPicPr>
+          <p:nvPr/>
+        </p:nvPicPr>
+        <p:blipFill>
+          <a:blip r:embed="rId7"/>
+          <a:stretch>
+            <a:fillRect/>
+          </a:stretch>
+        </p:blipFill>
+        <p:spPr>
+          <a:xfrm>
+            <a:off x="1760988" y="4459292"/>
+            <a:ext cx="1025806" cy="1025806"/>
+          </a:xfrm>
+          <a:prstGeom prst="rect">
+            <a:avLst/>
+          </a:prstGeom>
+        </p:spPr>
+      </p:pic>
+      <p:sp>
+        <p:nvSpPr>
+          <p:cNvPr id="17" name="TextBox 16"/>
+          <p:cNvSpPr txBox="1"/>
+          <p:nvPr/>
+        </p:nvSpPr>
+        <p:spPr>
+          <a:xfrm>
+            <a:off x="1397322" y="5491714"/>
+            <a:ext cx="1878339" cy="830997"/>
+          </a:xfrm>
+          <a:prstGeom prst="rect">
+            <a:avLst/>
+          </a:prstGeom>
+          <a:noFill/>
+        </p:spPr>
+        <p:txBody>
+          <a:bodyPr wrap="none" rtlCol="0">
+            <a:spAutoFit/>
+          </a:bodyPr>
+          <a:lstStyle/>
+          <a:p>
+            <a:pPr algn="ctr"/>
+            <a:r>
+              <a:rPr lang="en-US" dirty="0" err="1" smtClean="0"/>
+              <a:t>Zoubin</a:t>
+            </a:r>
+            <a:r>
+              <a:rPr lang="en-US" dirty="0"/>
+              <a:t/>
+            </a:r>
+            <a:br>
+              <a:rPr lang="en-US" dirty="0"/>
+            </a:br>
+            <a:r>
+              <a:rPr lang="en-US" dirty="0" err="1" smtClean="0"/>
+              <a:t>Ghahramani</a:t>
+            </a:r>
+            <a:endParaRPr lang="en-US" dirty="0"/>
+          </a:p>
+        </p:txBody>
+      </p:sp>
+    </p:spTree>
+    <p:extLst>
+      <p:ext uri="{BB962C8B-B14F-4D97-AF65-F5344CB8AC3E}">
+        <p14:creationId xmlns:p14="http://schemas.microsoft.com/office/powerpoint/2010/main" val="65411025"/>
+      </p:ext>
+    </p:extLst>
+  </p:cSld>
+  <p:clrMapOvr>
+    <a:masterClrMapping/>
+  </p:clrMapOvr>
+  <p:transition xmlns:p14="http://schemas.microsoft.com/office/powerpoint/2010/main">
+    <p:cut/>
+  </p:transition>
+  <p:timing>
+    <p:tnLst>
+      <p:par>
+        <p:cTn xmlns:p14="http://schemas.microsoft.com/office/powerpoint/2010/main" id="1" dur="indefinite" restart="never" nodeType="tmRoot"/>
+      </p:par>
+    </p:tnLst>
+  </p:timing>
+</p:sld>
+</file>
+
+<file path=ppt/slides/slide3.xml><?xml version="1.0" encoding="utf-8"?>
 <p:sld xmlns:a="http://schemas.openxmlformats.org/drawingml/2006/main" xmlns:r="http://schemas.openxmlformats.org/officeDocument/2006/relationships" xmlns:p="http://schemas.openxmlformats.org/presentationml/2006/main">
   <p:cSld>
     <p:spTree>
@@ -2172,7 +3038,7 @@
 </p:sld>
 </file>
 
-<file path=ppt/slides/slide2.xml><?xml version="1.0" encoding="utf-8"?>
+<file path=ppt/slides/slide4.xml><?xml version="1.0" encoding="utf-8"?>
 <p:sld xmlns:a="http://schemas.openxmlformats.org/drawingml/2006/main" xmlns:r="http://schemas.openxmlformats.org/officeDocument/2006/relationships" xmlns:p="http://schemas.openxmlformats.org/presentationml/2006/main">
   <p:cSld>
     <p:spTree>

</xml_diff>